<commit_message>
Update 2025 Présentation Atelier simulation.pptx
</commit_message>
<xml_diff>
--- a/2025 Présentation Atelier simulation.pptx
+++ b/2025 Présentation Atelier simulation.pptx
@@ -188,7 +188,7 @@
       <p15:sldGuideLst xmlns:p15="http://schemas.microsoft.com/office/powerpoint/2012/main"/>
     </p:ext>
     <p:ext uri="GoogleSlidesCustomDataVersion2">
-      <go:slidesCustomData xmlns="" xmlns:mc="http://schemas.openxmlformats.org/markup-compatibility/2006" xmlns:mv="urn:schemas-microsoft-com:mac:vml" xmlns:c="http://schemas.openxmlformats.org/drawingml/2006/chart" xmlns:dgm="http://schemas.openxmlformats.org/drawingml/2006/diagram" xmlns:o="urn:schemas-microsoft-com:office:office" xmlns:v="urn:schemas-microsoft-com:vml" xmlns:pvml="urn:schemas-microsoft-com:office:powerpoint" xmlns:com="http://schemas.openxmlformats.org/drawingml/2006/compatibility" xmlns:p14="http://schemas.microsoft.com/office/powerpoint/2010/main" xmlns:p15="http://schemas.microsoft.com/office/powerpoint/2012/main" xmlns:ahyp="http://schemas.microsoft.com/office/drawing/2018/hyperlinkcolor" xmlns:go="http://customooxmlschemas.google.com/" r:id="rId112" roundtripDataSignature="AMtx7mg8oW9L1FNHNhUIDcMb2/qIjO1x+g=="/>
+      <go:slidesCustomData xmlns:go="http://customooxmlschemas.google.com/" xmlns:ahyp="http://schemas.microsoft.com/office/drawing/2018/hyperlinkcolor" xmlns:p15="http://schemas.microsoft.com/office/powerpoint/2012/main" xmlns:p14="http://schemas.microsoft.com/office/powerpoint/2010/main" xmlns:com="http://schemas.openxmlformats.org/drawingml/2006/compatibility" xmlns:pvml="urn:schemas-microsoft-com:office:powerpoint" xmlns:v="urn:schemas-microsoft-com:vml" xmlns:o="urn:schemas-microsoft-com:office:office" xmlns:dgm="http://schemas.openxmlformats.org/drawingml/2006/diagram" xmlns:c="http://schemas.openxmlformats.org/drawingml/2006/chart" xmlns:mv="urn:schemas-microsoft-com:mac:vml" xmlns:mc="http://schemas.openxmlformats.org/markup-compatibility/2006" xmlns="" r:id="rId112" roundtripDataSignature="AMtx7mg8oW9L1FNHNhUIDcMb2/qIjO1x+g=="/>
     </p:ext>
   </p:extLst>
 </p:presentation>
@@ -199,7 +199,7 @@
   <pc:docChgLst>
     <pc:chgData name="Marc-André Ménard" userId="817d93e3-0101-4cff-a017-7d19de51de8f" providerId="ADAL" clId="{2B1C4FA4-21F0-46EF-914B-7093A1E193E4}"/>
     <pc:docChg chg="undo redo custSel addSld delSld modSld">
-      <pc:chgData name="Marc-André Ménard" userId="817d93e3-0101-4cff-a017-7d19de51de8f" providerId="ADAL" clId="{2B1C4FA4-21F0-46EF-914B-7093A1E193E4}" dt="2025-08-25T11:43:27.670" v="286" actId="2696"/>
+      <pc:chgData name="Marc-André Ménard" userId="817d93e3-0101-4cff-a017-7d19de51de8f" providerId="ADAL" clId="{2B1C4FA4-21F0-46EF-914B-7093A1E193E4}" dt="2025-08-25T12:42:59.784" v="722" actId="20577"/>
       <pc:docMkLst>
         <pc:docMk/>
       </pc:docMkLst>
@@ -586,7 +586,7 @@
         </pc:spChg>
       </pc:sldChg>
       <pc:sldChg chg="addSp modSp">
-        <pc:chgData name="Marc-André Ménard" userId="817d93e3-0101-4cff-a017-7d19de51de8f" providerId="ADAL" clId="{2B1C4FA4-21F0-46EF-914B-7093A1E193E4}" dt="2025-08-25T11:35:12.238" v="182" actId="403"/>
+        <pc:chgData name="Marc-André Ménard" userId="817d93e3-0101-4cff-a017-7d19de51de8f" providerId="ADAL" clId="{2B1C4FA4-21F0-46EF-914B-7093A1E193E4}" dt="2025-08-25T12:37:34.321" v="544" actId="6549"/>
         <pc:sldMkLst>
           <pc:docMk/>
           <pc:sldMk cId="1566703291" sldId="2465"/>
@@ -616,11 +616,19 @@
           </ac:spMkLst>
         </pc:spChg>
         <pc:spChg chg="add mod">
-          <ac:chgData name="Marc-André Ménard" userId="817d93e3-0101-4cff-a017-7d19de51de8f" providerId="ADAL" clId="{2B1C4FA4-21F0-46EF-914B-7093A1E193E4}" dt="2025-08-25T11:33:04.936" v="91" actId="20577"/>
+          <ac:chgData name="Marc-André Ménard" userId="817d93e3-0101-4cff-a017-7d19de51de8f" providerId="ADAL" clId="{2B1C4FA4-21F0-46EF-914B-7093A1E193E4}" dt="2025-08-25T12:33:28.853" v="287"/>
           <ac:spMkLst>
             <pc:docMk/>
             <pc:sldMk cId="1566703291" sldId="2465"/>
             <ac:spMk id="7" creationId="{9BC6974F-6B26-4114-8A40-960DDDBB3696}"/>
+          </ac:spMkLst>
+        </pc:spChg>
+        <pc:spChg chg="add mod">
+          <ac:chgData name="Marc-André Ménard" userId="817d93e3-0101-4cff-a017-7d19de51de8f" providerId="ADAL" clId="{2B1C4FA4-21F0-46EF-914B-7093A1E193E4}" dt="2025-08-25T12:37:34.321" v="544" actId="6549"/>
+          <ac:spMkLst>
+            <pc:docMk/>
+            <pc:sldMk cId="1566703291" sldId="2465"/>
+            <ac:spMk id="8" creationId="{0138BE32-51C7-46A8-A7E8-B7EF5BAF1C69}"/>
           </ac:spMkLst>
         </pc:spChg>
       </pc:sldChg>
@@ -898,7 +906,7 @@
         </pc:spChg>
       </pc:sldChg>
       <pc:sldChg chg="addSp modSp">
-        <pc:chgData name="Marc-André Ménard" userId="817d93e3-0101-4cff-a017-7d19de51de8f" providerId="ADAL" clId="{2B1C4FA4-21F0-46EF-914B-7093A1E193E4}" dt="2025-08-25T11:37:34.413" v="218" actId="207"/>
+        <pc:chgData name="Marc-André Ménard" userId="817d93e3-0101-4cff-a017-7d19de51de8f" providerId="ADAL" clId="{2B1C4FA4-21F0-46EF-914B-7093A1E193E4}" dt="2025-08-25T12:42:59.784" v="722" actId="20577"/>
         <pc:sldMkLst>
           <pc:docMk/>
           <pc:sldMk cId="470703908" sldId="2473"/>
@@ -925,6 +933,14 @@
             <pc:docMk/>
             <pc:sldMk cId="470703908" sldId="2473"/>
             <ac:spMk id="6" creationId="{950C34F8-D7C9-448E-B591-8CCCCEBBE2F6}"/>
+          </ac:spMkLst>
+        </pc:spChg>
+        <pc:spChg chg="add mod">
+          <ac:chgData name="Marc-André Ménard" userId="817d93e3-0101-4cff-a017-7d19de51de8f" providerId="ADAL" clId="{2B1C4FA4-21F0-46EF-914B-7093A1E193E4}" dt="2025-08-25T12:42:59.784" v="722" actId="20577"/>
+          <ac:spMkLst>
+            <pc:docMk/>
+            <pc:sldMk cId="470703908" sldId="2473"/>
+            <ac:spMk id="7" creationId="{FB3E7DBF-95CF-4327-8044-E065C4559D04}"/>
           </ac:spMkLst>
         </pc:spChg>
       </pc:sldChg>
@@ -14764,6 +14780,245 @@
           </a:p>
         </p:txBody>
       </p:sp>
+      <p:sp>
+        <p:nvSpPr>
+          <p:cNvPr id="7" name="Google Shape;309;p23">
+            <a:extLst>
+              <a:ext uri="{FF2B5EF4-FFF2-40B4-BE49-F238E27FC236}">
+                <a16:creationId xmlns:a16="http://schemas.microsoft.com/office/drawing/2014/main" id="{FB3E7DBF-95CF-4327-8044-E065C4559D04}"/>
+              </a:ext>
+            </a:extLst>
+          </p:cNvPr>
+          <p:cNvSpPr txBox="1">
+            <a:spLocks/>
+          </p:cNvSpPr>
+          <p:nvPr/>
+        </p:nvSpPr>
+        <p:spPr>
+          <a:xfrm>
+            <a:off x="1236225" y="2145724"/>
+            <a:ext cx="9342220" cy="3889002"/>
+          </a:xfrm>
+          <a:prstGeom prst="rect">
+            <a:avLst/>
+          </a:prstGeom>
+          <a:noFill/>
+        </p:spPr>
+        <p:txBody>
+          <a:bodyPr spcFirstLastPara="1" vert="horz" wrap="square" lIns="0" tIns="0" rIns="0" bIns="0" rtlCol="0" anchor="t" anchorCtr="0">
+            <a:normAutofit/>
+          </a:bodyPr>
+          <a:lstStyle>
+            <a:lvl1pPr marL="0" indent="0" algn="l" defTabSz="914400" rtl="0" eaLnBrk="1" latinLnBrk="0" hangingPunct="1">
+              <a:lnSpc>
+                <a:spcPct val="90000"/>
+              </a:lnSpc>
+              <a:spcBef>
+                <a:spcPts val="1000"/>
+              </a:spcBef>
+              <a:buClr>
+                <a:schemeClr val="tx2"/>
+              </a:buClr>
+              <a:buFont typeface="Arial" panose="020B0604020202020204" pitchFamily="34" charset="0"/>
+              <a:buNone/>
+              <a:defRPr sz="4000" b="0" i="0" kern="1200">
+                <a:solidFill>
+                  <a:schemeClr val="tx1"/>
+                </a:solidFill>
+                <a:latin typeface="Overpass Light" pitchFamily="2" charset="77"/>
+                <a:ea typeface="+mn-ea"/>
+                <a:cs typeface="+mn-cs"/>
+              </a:defRPr>
+            </a:lvl1pPr>
+            <a:lvl2pPr marL="685800" indent="-228600" algn="l" defTabSz="914400" rtl="0" eaLnBrk="1" latinLnBrk="0" hangingPunct="1">
+              <a:lnSpc>
+                <a:spcPct val="90000"/>
+              </a:lnSpc>
+              <a:spcBef>
+                <a:spcPts val="1000"/>
+              </a:spcBef>
+              <a:buClr>
+                <a:schemeClr val="tx2"/>
+              </a:buClr>
+              <a:buFont typeface="Arial" panose="020B0604020202020204" pitchFamily="34" charset="0"/>
+              <a:buChar char="•"/>
+              <a:defRPr sz="3600" b="0" i="0" kern="1200">
+                <a:solidFill>
+                  <a:schemeClr val="tx1"/>
+                </a:solidFill>
+                <a:latin typeface="Overpass Light" pitchFamily="2" charset="77"/>
+                <a:ea typeface="+mn-ea"/>
+                <a:cs typeface="+mn-cs"/>
+              </a:defRPr>
+            </a:lvl2pPr>
+            <a:lvl3pPr marL="1143000" indent="-228600" algn="l" defTabSz="914400" rtl="0" eaLnBrk="1" latinLnBrk="0" hangingPunct="1">
+              <a:lnSpc>
+                <a:spcPct val="90000"/>
+              </a:lnSpc>
+              <a:spcBef>
+                <a:spcPts val="600"/>
+              </a:spcBef>
+              <a:buClr>
+                <a:schemeClr val="tx2"/>
+              </a:buClr>
+              <a:buFont typeface="Arial" panose="020B0604020202020204" pitchFamily="34" charset="0"/>
+              <a:buChar char="•"/>
+              <a:defRPr sz="3200" b="0" i="0" kern="1200">
+                <a:solidFill>
+                  <a:schemeClr val="tx1"/>
+                </a:solidFill>
+                <a:latin typeface="Overpass Light" pitchFamily="2" charset="77"/>
+                <a:ea typeface="+mn-ea"/>
+                <a:cs typeface="+mn-cs"/>
+              </a:defRPr>
+            </a:lvl3pPr>
+            <a:lvl4pPr marL="1600200" indent="-228600" algn="l" defTabSz="914400" rtl="0" eaLnBrk="1" latinLnBrk="0" hangingPunct="1">
+              <a:lnSpc>
+                <a:spcPct val="90000"/>
+              </a:lnSpc>
+              <a:spcBef>
+                <a:spcPts val="300"/>
+              </a:spcBef>
+              <a:buClr>
+                <a:schemeClr val="tx2"/>
+              </a:buClr>
+              <a:buFont typeface="Arial" panose="020B0604020202020204" pitchFamily="34" charset="0"/>
+              <a:buChar char="•"/>
+              <a:defRPr sz="2400" b="0" i="0" kern="1200">
+                <a:solidFill>
+                  <a:schemeClr val="tx1"/>
+                </a:solidFill>
+                <a:latin typeface="Overpass Light" pitchFamily="2" charset="77"/>
+                <a:ea typeface="+mn-ea"/>
+                <a:cs typeface="+mn-cs"/>
+              </a:defRPr>
+            </a:lvl4pPr>
+            <a:lvl5pPr marL="2057400" indent="-228600" algn="l" defTabSz="914400" rtl="0" eaLnBrk="1" latinLnBrk="0" hangingPunct="1">
+              <a:lnSpc>
+                <a:spcPct val="90000"/>
+              </a:lnSpc>
+              <a:spcBef>
+                <a:spcPts val="500"/>
+              </a:spcBef>
+              <a:buClr>
+                <a:schemeClr val="tx2"/>
+              </a:buClr>
+              <a:buFont typeface="Arial" panose="020B0604020202020204" pitchFamily="34" charset="0"/>
+              <a:buChar char="•"/>
+              <a:defRPr sz="2000" b="0" i="0" kern="1200">
+                <a:solidFill>
+                  <a:schemeClr val="tx1"/>
+                </a:solidFill>
+                <a:latin typeface="Overpass Light" pitchFamily="2" charset="77"/>
+                <a:ea typeface="+mn-ea"/>
+                <a:cs typeface="+mn-cs"/>
+              </a:defRPr>
+            </a:lvl5pPr>
+            <a:lvl6pPr marL="2514600" indent="-228600" algn="l" defTabSz="914400" rtl="0" eaLnBrk="1" latinLnBrk="0" hangingPunct="1">
+              <a:lnSpc>
+                <a:spcPct val="90000"/>
+              </a:lnSpc>
+              <a:spcBef>
+                <a:spcPts val="500"/>
+              </a:spcBef>
+              <a:buFont typeface="Arial" panose="020B0604020202020204" pitchFamily="34" charset="0"/>
+              <a:buChar char="•"/>
+              <a:defRPr sz="1800" kern="1200">
+                <a:solidFill>
+                  <a:schemeClr val="tx1"/>
+                </a:solidFill>
+                <a:latin typeface="+mn-lt"/>
+                <a:ea typeface="+mn-ea"/>
+                <a:cs typeface="+mn-cs"/>
+              </a:defRPr>
+            </a:lvl6pPr>
+            <a:lvl7pPr marL="2971800" indent="-228600" algn="l" defTabSz="914400" rtl="0" eaLnBrk="1" latinLnBrk="0" hangingPunct="1">
+              <a:lnSpc>
+                <a:spcPct val="90000"/>
+              </a:lnSpc>
+              <a:spcBef>
+                <a:spcPts val="500"/>
+              </a:spcBef>
+              <a:buFont typeface="Arial" panose="020B0604020202020204" pitchFamily="34" charset="0"/>
+              <a:buChar char="•"/>
+              <a:defRPr sz="1800" kern="1200">
+                <a:solidFill>
+                  <a:schemeClr val="tx1"/>
+                </a:solidFill>
+                <a:latin typeface="+mn-lt"/>
+                <a:ea typeface="+mn-ea"/>
+                <a:cs typeface="+mn-cs"/>
+              </a:defRPr>
+            </a:lvl7pPr>
+            <a:lvl8pPr marL="3429000" indent="-228600" algn="l" defTabSz="914400" rtl="0" eaLnBrk="1" latinLnBrk="0" hangingPunct="1">
+              <a:lnSpc>
+                <a:spcPct val="90000"/>
+              </a:lnSpc>
+              <a:spcBef>
+                <a:spcPts val="500"/>
+              </a:spcBef>
+              <a:buFont typeface="Arial" panose="020B0604020202020204" pitchFamily="34" charset="0"/>
+              <a:buChar char="•"/>
+              <a:defRPr sz="1800" kern="1200">
+                <a:solidFill>
+                  <a:schemeClr val="tx1"/>
+                </a:solidFill>
+                <a:latin typeface="+mn-lt"/>
+                <a:ea typeface="+mn-ea"/>
+                <a:cs typeface="+mn-cs"/>
+              </a:defRPr>
+            </a:lvl8pPr>
+            <a:lvl9pPr marL="3886200" indent="-228600" algn="l" defTabSz="914400" rtl="0" eaLnBrk="1" latinLnBrk="0" hangingPunct="1">
+              <a:lnSpc>
+                <a:spcPct val="90000"/>
+              </a:lnSpc>
+              <a:spcBef>
+                <a:spcPts val="500"/>
+              </a:spcBef>
+              <a:buFont typeface="Arial" panose="020B0604020202020204" pitchFamily="34" charset="0"/>
+              <a:buChar char="•"/>
+              <a:defRPr sz="1800" kern="1200">
+                <a:solidFill>
+                  <a:schemeClr val="tx1"/>
+                </a:solidFill>
+                <a:latin typeface="+mn-lt"/>
+                <a:ea typeface="+mn-ea"/>
+                <a:cs typeface="+mn-cs"/>
+              </a:defRPr>
+            </a:lvl9pPr>
+          </a:lstStyle>
+          <a:p>
+            <a:pPr marL="457200" indent="-457200">
+              <a:spcBef>
+                <a:spcPts val="1067"/>
+              </a:spcBef>
+              <a:buFont typeface="Arial" panose="020B0604020202020204" pitchFamily="34" charset="0"/>
+              <a:buChar char="•"/>
+            </a:pPr>
+            <a:r>
+              <a:rPr lang="fr-CA" sz="2600">
+                <a:latin typeface="Arial" panose="020B0604020202020204" pitchFamily="34" charset="0"/>
+                <a:cs typeface="Arial" panose="020B0604020202020204" pitchFamily="34" charset="0"/>
+                <a:sym typeface="Overpass"/>
+              </a:rPr>
+              <a:t>Consiste à </a:t>
+            </a:r>
+            <a:r>
+              <a:rPr lang="fr-CA" sz="2600" dirty="0">
+                <a:latin typeface="Arial" panose="020B0604020202020204" pitchFamily="34" charset="0"/>
+                <a:cs typeface="Arial" panose="020B0604020202020204" pitchFamily="34" charset="0"/>
+                <a:sym typeface="Overpass"/>
+              </a:rPr>
+              <a:t>exécuter plusieurs fois la même expérimentation afin d’évaluer la variabilité des résultats.</a:t>
+            </a:r>
+            <a:endParaRPr lang="fr-CA" sz="2200" dirty="0">
+              <a:latin typeface="Arial" panose="020B0604020202020204" pitchFamily="34" charset="0"/>
+              <a:cs typeface="Arial" panose="020B0604020202020204" pitchFamily="34" charset="0"/>
+              <a:sym typeface="Overpass"/>
+            </a:endParaRPr>
+          </a:p>
+        </p:txBody>
+      </p:sp>
     </p:spTree>
     <p:extLst>
       <p:ext uri="{BB962C8B-B14F-4D97-AF65-F5344CB8AC3E}">
@@ -44035,6 +44290,382 @@
               <a:cs typeface="Arial" panose="020B0604020202020204" pitchFamily="34" charset="0"/>
               <a:sym typeface="Overpass"/>
             </a:endParaRPr>
+          </a:p>
+        </p:txBody>
+      </p:sp>
+      <p:sp>
+        <p:nvSpPr>
+          <p:cNvPr id="8" name="Google Shape;309;p23">
+            <a:extLst>
+              <a:ext uri="{FF2B5EF4-FFF2-40B4-BE49-F238E27FC236}">
+                <a16:creationId xmlns:a16="http://schemas.microsoft.com/office/drawing/2014/main" id="{0138BE32-51C7-46A8-A7E8-B7EF5BAF1C69}"/>
+              </a:ext>
+            </a:extLst>
+          </p:cNvPr>
+          <p:cNvSpPr txBox="1">
+            <a:spLocks/>
+          </p:cNvSpPr>
+          <p:nvPr/>
+        </p:nvSpPr>
+        <p:spPr>
+          <a:xfrm>
+            <a:off x="972600" y="1673900"/>
+            <a:ext cx="9266806" cy="3889002"/>
+          </a:xfrm>
+          <a:prstGeom prst="rect">
+            <a:avLst/>
+          </a:prstGeom>
+          <a:noFill/>
+        </p:spPr>
+        <p:txBody>
+          <a:bodyPr spcFirstLastPara="1" vert="horz" wrap="square" lIns="0" tIns="0" rIns="0" bIns="0" rtlCol="0" anchor="t" anchorCtr="0">
+            <a:noAutofit/>
+          </a:bodyPr>
+          <a:lstStyle>
+            <a:lvl1pPr marL="0" indent="0" algn="l" defTabSz="914400" rtl="0" eaLnBrk="1" latinLnBrk="0" hangingPunct="1">
+              <a:lnSpc>
+                <a:spcPct val="90000"/>
+              </a:lnSpc>
+              <a:spcBef>
+                <a:spcPts val="1000"/>
+              </a:spcBef>
+              <a:buClr>
+                <a:schemeClr val="tx2"/>
+              </a:buClr>
+              <a:buFont typeface="Arial" panose="020B0604020202020204" pitchFamily="34" charset="0"/>
+              <a:buNone/>
+              <a:defRPr sz="4000" b="0" i="0" kern="1200">
+                <a:solidFill>
+                  <a:schemeClr val="tx1"/>
+                </a:solidFill>
+                <a:latin typeface="Overpass Light" pitchFamily="2" charset="77"/>
+                <a:ea typeface="+mn-ea"/>
+                <a:cs typeface="+mn-cs"/>
+              </a:defRPr>
+            </a:lvl1pPr>
+            <a:lvl2pPr marL="685800" indent="-228600" algn="l" defTabSz="914400" rtl="0" eaLnBrk="1" latinLnBrk="0" hangingPunct="1">
+              <a:lnSpc>
+                <a:spcPct val="90000"/>
+              </a:lnSpc>
+              <a:spcBef>
+                <a:spcPts val="1000"/>
+              </a:spcBef>
+              <a:buClr>
+                <a:schemeClr val="tx2"/>
+              </a:buClr>
+              <a:buFont typeface="Arial" panose="020B0604020202020204" pitchFamily="34" charset="0"/>
+              <a:buChar char="•"/>
+              <a:defRPr sz="3600" b="0" i="0" kern="1200">
+                <a:solidFill>
+                  <a:schemeClr val="tx1"/>
+                </a:solidFill>
+                <a:latin typeface="Overpass Light" pitchFamily="2" charset="77"/>
+                <a:ea typeface="+mn-ea"/>
+                <a:cs typeface="+mn-cs"/>
+              </a:defRPr>
+            </a:lvl2pPr>
+            <a:lvl3pPr marL="1143000" indent="-228600" algn="l" defTabSz="914400" rtl="0" eaLnBrk="1" latinLnBrk="0" hangingPunct="1">
+              <a:lnSpc>
+                <a:spcPct val="90000"/>
+              </a:lnSpc>
+              <a:spcBef>
+                <a:spcPts val="600"/>
+              </a:spcBef>
+              <a:buClr>
+                <a:schemeClr val="tx2"/>
+              </a:buClr>
+              <a:buFont typeface="Arial" panose="020B0604020202020204" pitchFamily="34" charset="0"/>
+              <a:buChar char="•"/>
+              <a:defRPr sz="3200" b="0" i="0" kern="1200">
+                <a:solidFill>
+                  <a:schemeClr val="tx1"/>
+                </a:solidFill>
+                <a:latin typeface="Overpass Light" pitchFamily="2" charset="77"/>
+                <a:ea typeface="+mn-ea"/>
+                <a:cs typeface="+mn-cs"/>
+              </a:defRPr>
+            </a:lvl3pPr>
+            <a:lvl4pPr marL="1600200" indent="-228600" algn="l" defTabSz="914400" rtl="0" eaLnBrk="1" latinLnBrk="0" hangingPunct="1">
+              <a:lnSpc>
+                <a:spcPct val="90000"/>
+              </a:lnSpc>
+              <a:spcBef>
+                <a:spcPts val="300"/>
+              </a:spcBef>
+              <a:buClr>
+                <a:schemeClr val="tx2"/>
+              </a:buClr>
+              <a:buFont typeface="Arial" panose="020B0604020202020204" pitchFamily="34" charset="0"/>
+              <a:buChar char="•"/>
+              <a:defRPr sz="2400" b="0" i="0" kern="1200">
+                <a:solidFill>
+                  <a:schemeClr val="tx1"/>
+                </a:solidFill>
+                <a:latin typeface="Overpass Light" pitchFamily="2" charset="77"/>
+                <a:ea typeface="+mn-ea"/>
+                <a:cs typeface="+mn-cs"/>
+              </a:defRPr>
+            </a:lvl4pPr>
+            <a:lvl5pPr marL="2057400" indent="-228600" algn="l" defTabSz="914400" rtl="0" eaLnBrk="1" latinLnBrk="0" hangingPunct="1">
+              <a:lnSpc>
+                <a:spcPct val="90000"/>
+              </a:lnSpc>
+              <a:spcBef>
+                <a:spcPts val="500"/>
+              </a:spcBef>
+              <a:buClr>
+                <a:schemeClr val="tx2"/>
+              </a:buClr>
+              <a:buFont typeface="Arial" panose="020B0604020202020204" pitchFamily="34" charset="0"/>
+              <a:buChar char="•"/>
+              <a:defRPr sz="2000" b="0" i="0" kern="1200">
+                <a:solidFill>
+                  <a:schemeClr val="tx1"/>
+                </a:solidFill>
+                <a:latin typeface="Overpass Light" pitchFamily="2" charset="77"/>
+                <a:ea typeface="+mn-ea"/>
+                <a:cs typeface="+mn-cs"/>
+              </a:defRPr>
+            </a:lvl5pPr>
+            <a:lvl6pPr marL="2514600" indent="-228600" algn="l" defTabSz="914400" rtl="0" eaLnBrk="1" latinLnBrk="0" hangingPunct="1">
+              <a:lnSpc>
+                <a:spcPct val="90000"/>
+              </a:lnSpc>
+              <a:spcBef>
+                <a:spcPts val="500"/>
+              </a:spcBef>
+              <a:buFont typeface="Arial" panose="020B0604020202020204" pitchFamily="34" charset="0"/>
+              <a:buChar char="•"/>
+              <a:defRPr sz="1800" kern="1200">
+                <a:solidFill>
+                  <a:schemeClr val="tx1"/>
+                </a:solidFill>
+                <a:latin typeface="+mn-lt"/>
+                <a:ea typeface="+mn-ea"/>
+                <a:cs typeface="+mn-cs"/>
+              </a:defRPr>
+            </a:lvl6pPr>
+            <a:lvl7pPr marL="2971800" indent="-228600" algn="l" defTabSz="914400" rtl="0" eaLnBrk="1" latinLnBrk="0" hangingPunct="1">
+              <a:lnSpc>
+                <a:spcPct val="90000"/>
+              </a:lnSpc>
+              <a:spcBef>
+                <a:spcPts val="500"/>
+              </a:spcBef>
+              <a:buFont typeface="Arial" panose="020B0604020202020204" pitchFamily="34" charset="0"/>
+              <a:buChar char="•"/>
+              <a:defRPr sz="1800" kern="1200">
+                <a:solidFill>
+                  <a:schemeClr val="tx1"/>
+                </a:solidFill>
+                <a:latin typeface="+mn-lt"/>
+                <a:ea typeface="+mn-ea"/>
+                <a:cs typeface="+mn-cs"/>
+              </a:defRPr>
+            </a:lvl7pPr>
+            <a:lvl8pPr marL="3429000" indent="-228600" algn="l" defTabSz="914400" rtl="0" eaLnBrk="1" latinLnBrk="0" hangingPunct="1">
+              <a:lnSpc>
+                <a:spcPct val="90000"/>
+              </a:lnSpc>
+              <a:spcBef>
+                <a:spcPts val="500"/>
+              </a:spcBef>
+              <a:buFont typeface="Arial" panose="020B0604020202020204" pitchFamily="34" charset="0"/>
+              <a:buChar char="•"/>
+              <a:defRPr sz="1800" kern="1200">
+                <a:solidFill>
+                  <a:schemeClr val="tx1"/>
+                </a:solidFill>
+                <a:latin typeface="+mn-lt"/>
+                <a:ea typeface="+mn-ea"/>
+                <a:cs typeface="+mn-cs"/>
+              </a:defRPr>
+            </a:lvl8pPr>
+            <a:lvl9pPr marL="3886200" indent="-228600" algn="l" defTabSz="914400" rtl="0" eaLnBrk="1" latinLnBrk="0" hangingPunct="1">
+              <a:lnSpc>
+                <a:spcPct val="90000"/>
+              </a:lnSpc>
+              <a:spcBef>
+                <a:spcPts val="500"/>
+              </a:spcBef>
+              <a:buFont typeface="Arial" panose="020B0604020202020204" pitchFamily="34" charset="0"/>
+              <a:buChar char="•"/>
+              <a:defRPr sz="1800" kern="1200">
+                <a:solidFill>
+                  <a:schemeClr val="tx1"/>
+                </a:solidFill>
+                <a:latin typeface="+mn-lt"/>
+                <a:ea typeface="+mn-ea"/>
+                <a:cs typeface="+mn-cs"/>
+              </a:defRPr>
+            </a:lvl9pPr>
+          </a:lstStyle>
+          <a:p>
+            <a:pPr marL="457200" indent="-457200">
+              <a:spcBef>
+                <a:spcPts val="1067"/>
+              </a:spcBef>
+              <a:buFont typeface="Arial" panose="020B0604020202020204" pitchFamily="34" charset="0"/>
+              <a:buChar char="•"/>
+            </a:pPr>
+            <a:r>
+              <a:rPr lang="fr-CA" sz="2400" dirty="0">
+                <a:latin typeface="Arial" panose="020B0604020202020204" pitchFamily="34" charset="0"/>
+                <a:cs typeface="Arial" panose="020B0604020202020204" pitchFamily="34" charset="0"/>
+                <a:sym typeface="Overpass"/>
+              </a:rPr>
+              <a:t>Outils de simulation basés sur le code</a:t>
+            </a:r>
+            <a:endParaRPr lang="fr-FR" sz="2400" i="1" dirty="0">
+              <a:latin typeface="Arial" panose="020B0604020202020204" pitchFamily="34" charset="0"/>
+              <a:cs typeface="Arial" panose="020B0604020202020204" pitchFamily="34" charset="0"/>
+              <a:sym typeface="Overpass"/>
+            </a:endParaRPr>
+          </a:p>
+          <a:p>
+            <a:pPr marL="1143000" lvl="1" indent="-457200">
+              <a:spcBef>
+                <a:spcPts val="1067"/>
+              </a:spcBef>
+            </a:pPr>
+            <a:r>
+              <a:rPr lang="fr-CA" sz="2000" dirty="0" err="1">
+                <a:latin typeface="Arial" panose="020B0604020202020204" pitchFamily="34" charset="0"/>
+                <a:cs typeface="Arial" panose="020B0604020202020204" pitchFamily="34" charset="0"/>
+                <a:sym typeface="Overpass"/>
+              </a:rPr>
+              <a:t>SimPy</a:t>
+            </a:r>
+            <a:r>
+              <a:rPr lang="fr-CA" sz="2000" dirty="0">
+                <a:latin typeface="Arial" panose="020B0604020202020204" pitchFamily="34" charset="0"/>
+                <a:cs typeface="Arial" panose="020B0604020202020204" pitchFamily="34" charset="0"/>
+                <a:sym typeface="Overpass"/>
+              </a:rPr>
+              <a:t> (Python), </a:t>
+            </a:r>
+            <a:r>
+              <a:rPr lang="fr-CA" sz="2000" dirty="0" err="1">
+                <a:latin typeface="Arial" panose="020B0604020202020204" pitchFamily="34" charset="0"/>
+                <a:cs typeface="Arial" panose="020B0604020202020204" pitchFamily="34" charset="0"/>
+                <a:sym typeface="Overpass"/>
+              </a:rPr>
+              <a:t>OpenFoam</a:t>
+            </a:r>
+            <a:r>
+              <a:rPr lang="fr-CA" sz="2000" dirty="0">
+                <a:latin typeface="Arial" panose="020B0604020202020204" pitchFamily="34" charset="0"/>
+                <a:cs typeface="Arial" panose="020B0604020202020204" pitchFamily="34" charset="0"/>
+                <a:sym typeface="Overpass"/>
+              </a:rPr>
+              <a:t> (C++), MATLAB</a:t>
+            </a:r>
+          </a:p>
+          <a:p>
+            <a:pPr marL="457200" indent="-457200">
+              <a:spcBef>
+                <a:spcPts val="1067"/>
+              </a:spcBef>
+              <a:buFont typeface="Arial" panose="020B0604020202020204" pitchFamily="34" charset="0"/>
+              <a:buChar char="•"/>
+            </a:pPr>
+            <a:endParaRPr lang="fr-FR" sz="2400" i="1" dirty="0">
+              <a:latin typeface="Arial" panose="020B0604020202020204" pitchFamily="34" charset="0"/>
+              <a:cs typeface="Arial" panose="020B0604020202020204" pitchFamily="34" charset="0"/>
+              <a:sym typeface="Overpass"/>
+            </a:endParaRPr>
+          </a:p>
+          <a:p>
+            <a:pPr marL="457200" indent="-457200">
+              <a:spcBef>
+                <a:spcPts val="1067"/>
+              </a:spcBef>
+              <a:buFont typeface="Arial" panose="020B0604020202020204" pitchFamily="34" charset="0"/>
+              <a:buChar char="•"/>
+            </a:pPr>
+            <a:r>
+              <a:rPr lang="fr-FR" sz="2400" i="1" dirty="0">
+                <a:latin typeface="Arial" panose="020B0604020202020204" pitchFamily="34" charset="0"/>
+                <a:cs typeface="Arial" panose="020B0604020202020204" pitchFamily="34" charset="0"/>
+                <a:sym typeface="Overpass"/>
+              </a:rPr>
+              <a:t>Outils avec interface graphique</a:t>
+            </a:r>
+          </a:p>
+          <a:p>
+            <a:pPr marL="1143000" lvl="1" indent="-457200">
+              <a:spcBef>
+                <a:spcPts val="1067"/>
+              </a:spcBef>
+            </a:pPr>
+            <a:r>
+              <a:rPr lang="fr-FR" sz="2000" i="1" dirty="0" err="1">
+                <a:latin typeface="Arial" panose="020B0604020202020204" pitchFamily="34" charset="0"/>
+                <a:cs typeface="Arial" panose="020B0604020202020204" pitchFamily="34" charset="0"/>
+                <a:sym typeface="Overpass"/>
+              </a:rPr>
+              <a:t>Simio</a:t>
+            </a:r>
+            <a:r>
+              <a:rPr lang="fr-FR" sz="2000" i="1" dirty="0">
+                <a:latin typeface="Arial" panose="020B0604020202020204" pitchFamily="34" charset="0"/>
+                <a:cs typeface="Arial" panose="020B0604020202020204" pitchFamily="34" charset="0"/>
+                <a:sym typeface="Overpass"/>
+              </a:rPr>
+              <a:t>, Arena, Simulink</a:t>
+            </a:r>
+          </a:p>
+          <a:p>
+            <a:pPr marL="1143000" lvl="1" indent="-457200">
+              <a:spcBef>
+                <a:spcPts val="1067"/>
+              </a:spcBef>
+            </a:pPr>
+            <a:endParaRPr lang="fr-FR" sz="2000" i="1" dirty="0">
+              <a:latin typeface="Arial" panose="020B0604020202020204" pitchFamily="34" charset="0"/>
+              <a:cs typeface="Arial" panose="020B0604020202020204" pitchFamily="34" charset="0"/>
+              <a:sym typeface="Overpass"/>
+            </a:endParaRPr>
+          </a:p>
+          <a:p>
+            <a:pPr marL="457200" indent="-457200">
+              <a:spcBef>
+                <a:spcPts val="1067"/>
+              </a:spcBef>
+              <a:buFont typeface="Arial" panose="020B0604020202020204" pitchFamily="34" charset="0"/>
+              <a:buChar char="•"/>
+            </a:pPr>
+            <a:r>
+              <a:rPr lang="fr-FR" sz="2400" i="1" dirty="0">
+                <a:latin typeface="Arial" panose="020B0604020202020204" pitchFamily="34" charset="0"/>
+                <a:cs typeface="Arial" panose="020B0604020202020204" pitchFamily="34" charset="0"/>
+                <a:sym typeface="Overpass"/>
+              </a:rPr>
+              <a:t>Outils hybrides (GUI + scripts)</a:t>
+            </a:r>
+          </a:p>
+          <a:p>
+            <a:pPr marL="1143000" lvl="1" indent="-457200">
+              <a:spcBef>
+                <a:spcPts val="1067"/>
+              </a:spcBef>
+            </a:pPr>
+            <a:r>
+              <a:rPr lang="fr-CA" sz="2000" dirty="0" err="1">
+                <a:latin typeface="Arial" panose="020B0604020202020204" pitchFamily="34" charset="0"/>
+                <a:cs typeface="Arial" panose="020B0604020202020204" pitchFamily="34" charset="0"/>
+                <a:sym typeface="Overpass"/>
+              </a:rPr>
+              <a:t>AnyLogic</a:t>
+            </a:r>
+            <a:r>
+              <a:rPr lang="fr-CA" sz="2000" dirty="0">
+                <a:latin typeface="Arial" panose="020B0604020202020204" pitchFamily="34" charset="0"/>
+                <a:cs typeface="Arial" panose="020B0604020202020204" pitchFamily="34" charset="0"/>
+                <a:sym typeface="Overpass"/>
+              </a:rPr>
+              <a:t>, GAMA, </a:t>
+            </a:r>
           </a:p>
         </p:txBody>
       </p:sp>
@@ -48037,6 +48668,15 @@
 </file>
 
 <file path=customXml/item1.xml><?xml version="1.0" encoding="utf-8"?>
+<?mso-contentType ?>
+<FormTemplates xmlns="http://schemas.microsoft.com/sharepoint/v3/contenttype/forms">
+  <Display>DocumentLibraryForm</Display>
+  <Edit>DocumentLibraryForm</Edit>
+  <New>DocumentLibraryForm</New>
+</FormTemplates>
+</file>
+
+<file path=customXml/item2.xml><?xml version="1.0" encoding="utf-8"?>
 <p:properties xmlns:p="http://schemas.microsoft.com/office/2006/metadata/properties" xmlns:xsi="http://www.w3.org/2001/XMLSchema-instance" xmlns:pc="http://schemas.microsoft.com/office/infopath/2007/PartnerControls">
   <documentManagement>
     <lcf76f155ced4ddcb4097134ff3c332f xmlns="3df372fd-abda-494f-b3ef-597d7144351d">
@@ -48047,7 +48687,7 @@
 </p:properties>
 </file>
 
-<file path=customXml/item2.xml><?xml version="1.0" encoding="utf-8"?>
+<file path=customXml/item3.xml><?xml version="1.0" encoding="utf-8"?>
 <ct:contentTypeSchema xmlns:ct="http://schemas.microsoft.com/office/2006/metadata/contentType" xmlns:ma="http://schemas.microsoft.com/office/2006/metadata/properties/metaAttributes" ct:_="" ma:_="" ma:contentTypeName="Document" ma:contentTypeID="0x01010077A6EDE945B30D42982FA5C5A3CB247F" ma:contentTypeVersion="16" ma:contentTypeDescription="Create a new document." ma:contentTypeScope="" ma:versionID="b4587c546cfa4b3c7badc3b07faf4ecf">
   <xsd:schema xmlns:xsd="http://www.w3.org/2001/XMLSchema" xmlns:xs="http://www.w3.org/2001/XMLSchema" xmlns:p="http://schemas.microsoft.com/office/2006/metadata/properties" xmlns:ns2="3df372fd-abda-494f-b3ef-597d7144351d" xmlns:ns3="ef9f6260-94a2-4740-ad34-75e88d3254ce" targetNamespace="http://schemas.microsoft.com/office/2006/metadata/properties" ma:root="true" ma:fieldsID="a5423d91dbdc042563dc8b0edf4219c2" ns2:_="" ns3:_="">
     <xsd:import namespace="3df372fd-abda-494f-b3ef-597d7144351d"/>
@@ -48288,40 +48928,46 @@
 </ct:contentTypeSchema>
 </file>
 
-<file path=customXml/item3.xml><?xml version="1.0" encoding="utf-8"?>
-<?mso-contentType ?>
-<FormTemplates xmlns="http://schemas.microsoft.com/sharepoint/v3/contenttype/forms">
-  <Display>DocumentLibraryForm</Display>
-  <Edit>DocumentLibraryForm</Edit>
-  <New>DocumentLibraryForm</New>
-</FormTemplates>
-</file>
-
 <file path=customXml/itemProps1.xml><?xml version="1.0" encoding="utf-8"?>
-<ds:datastoreItem xmlns:ds="http://schemas.openxmlformats.org/officeDocument/2006/customXml" ds:itemID="{92BB7799-CF5F-47DA-A545-414E5BC4CEE8}">
+<ds:datastoreItem xmlns:ds="http://schemas.openxmlformats.org/officeDocument/2006/customXml" ds:itemID="{FC86F482-16C8-44C5-A3C6-DA887871ECFB}">
   <ds:schemaRefs>
-    <ds:schemaRef ds:uri="http://schemas.microsoft.com/office/2006/metadata/properties"/>
-    <ds:schemaRef ds:uri="http://purl.org/dc/elements/1.1/"/>
-    <ds:schemaRef ds:uri="http://schemas.microsoft.com/office/infopath/2007/PartnerControls"/>
-    <ds:schemaRef ds:uri="http://schemas.microsoft.com/office/2006/documentManagement/types"/>
-    <ds:schemaRef ds:uri="http://schemas.openxmlformats.org/package/2006/metadata/core-properties"/>
-    <ds:schemaRef ds:uri="3df372fd-abda-494f-b3ef-597d7144351d"/>
-    <ds:schemaRef ds:uri="http://www.w3.org/XML/1998/namespace"/>
-    <ds:schemaRef ds:uri="ef9f6260-94a2-4740-ad34-75e88d3254ce"/>
-    <ds:schemaRef ds:uri="http://purl.org/dc/dcmitype/"/>
-    <ds:schemaRef ds:uri="http://purl.org/dc/terms/"/>
+    <ds:schemaRef ds:uri="http://schemas.microsoft.com/sharepoint/v3/contenttype/forms"/>
   </ds:schemaRefs>
 </ds:datastoreItem>
 </file>
 
 <file path=customXml/itemProps2.xml><?xml version="1.0" encoding="utf-8"?>
-<ds:datastoreItem xmlns:ds="http://schemas.openxmlformats.org/officeDocument/2006/customXml" ds:itemID="{7C22235A-DF62-465B-AF23-0FC0D33222D4}"/>
+<ds:datastoreItem xmlns:ds="http://schemas.openxmlformats.org/officeDocument/2006/customXml" ds:itemID="{92BB7799-CF5F-47DA-A545-414E5BC4CEE8}">
+  <ds:schemaRefs>
+    <ds:schemaRef ds:uri="http://purl.org/dc/terms/"/>
+    <ds:schemaRef ds:uri="http://schemas.microsoft.com/office/2006/documentManagement/types"/>
+    <ds:schemaRef ds:uri="http://purl.org/dc/dcmitype/"/>
+    <ds:schemaRef ds:uri="http://purl.org/dc/elements/1.1/"/>
+    <ds:schemaRef ds:uri="http://schemas.microsoft.com/office/infopath/2007/PartnerControls"/>
+    <ds:schemaRef ds:uri="http://schemas.openxmlformats.org/package/2006/metadata/core-properties"/>
+    <ds:schemaRef ds:uri="ef9f6260-94a2-4740-ad34-75e88d3254ce"/>
+    <ds:schemaRef ds:uri="3df372fd-abda-494f-b3ef-597d7144351d"/>
+    <ds:schemaRef ds:uri="http://schemas.microsoft.com/office/2006/metadata/properties"/>
+    <ds:schemaRef ds:uri="http://www.w3.org/XML/1998/namespace"/>
+  </ds:schemaRefs>
+</ds:datastoreItem>
 </file>
 
 <file path=customXml/itemProps3.xml><?xml version="1.0" encoding="utf-8"?>
-<ds:datastoreItem xmlns:ds="http://schemas.openxmlformats.org/officeDocument/2006/customXml" ds:itemID="{FC86F482-16C8-44C5-A3C6-DA887871ECFB}">
+<ds:datastoreItem xmlns:ds="http://schemas.openxmlformats.org/officeDocument/2006/customXml" ds:itemID="{7C22235A-DF62-465B-AF23-0FC0D33222D4}">
   <ds:schemaRefs>
-    <ds:schemaRef ds:uri="http://schemas.microsoft.com/sharepoint/v3/contenttype/forms"/>
+    <ds:schemaRef ds:uri="http://schemas.microsoft.com/office/2006/metadata/contentType"/>
+    <ds:schemaRef ds:uri="http://schemas.microsoft.com/office/2006/metadata/properties/metaAttributes"/>
+    <ds:schemaRef ds:uri="http://www.w3.org/2001/XMLSchema"/>
+    <ds:schemaRef ds:uri="http://schemas.microsoft.com/office/2006/metadata/properties"/>
+    <ds:schemaRef ds:uri="3df372fd-abda-494f-b3ef-597d7144351d"/>
+    <ds:schemaRef ds:uri="ef9f6260-94a2-4740-ad34-75e88d3254ce"/>
+    <ds:schemaRef ds:uri="http://schemas.microsoft.com/office/2006/documentManagement/types"/>
+    <ds:schemaRef ds:uri="http://schemas.microsoft.com/office/infopath/2007/PartnerControls"/>
+    <ds:schemaRef ds:uri="http://schemas.openxmlformats.org/package/2006/metadata/core-properties"/>
+    <ds:schemaRef ds:uri="http://purl.org/dc/elements/1.1/"/>
+    <ds:schemaRef ds:uri="http://purl.org/dc/terms/"/>
+    <ds:schemaRef ds:uri="http://schemas.microsoft.com/internal/obd"/>
   </ds:schemaRefs>
 </ds:datastoreItem>
 </file>
</xml_diff>